<commit_message>
code to output power point slide with table
</commit_message>
<xml_diff>
--- a/Templates/UpdateExistingTable.pptx
+++ b/Templates/UpdateExistingTable.pptx
@@ -3146,7 +3146,7 @@
           <p:nvPr/>
         </p:nvGraphicFramePr>
         <p:xfrm>
-          <a:off x="462915" y="1052830"/>
+          <a:off x="462915" y="837565"/>
           <a:ext cx="836295" cy="753745"/>
         </p:xfrm>
         <a:graphic>
@@ -3184,6 +3184,11 @@
                       <a:pPr>
                         <a:buNone/>
                       </a:pPr>
+                      <a:endParaRPr lang="en-GB" sz="1200" b="0">
+                        <a:solidFill>
+                          <a:schemeClr val="tx1"/>
+                        </a:solidFill>
+                      </a:endParaRPr>
                     </a:p>
                   </a:txBody>
                   <a:tcPr/>
@@ -3193,6 +3198,36 @@
           </a:graphicData>
         </a:graphic>
       </p:graphicFrame>
+      <p:sp>
+        <p:nvSpPr>
+          <p:cNvPr id="2" name="Text Box 1"/>
+          <p:cNvSpPr txBox="1"/>
+          <p:nvPr/>
+        </p:nvSpPr>
+        <p:spPr>
+          <a:xfrm>
+            <a:off x="36830" y="93345"/>
+            <a:ext cx="9091295" cy="368300"/>
+          </a:xfrm>
+          <a:prstGeom prst="rect">
+            <a:avLst/>
+          </a:prstGeom>
+          <a:noFill/>
+        </p:spPr>
+        <p:txBody>
+          <a:bodyPr wrap="square" rtlCol="0">
+            <a:spAutoFit/>
+          </a:bodyPr>
+          <a:p>
+            <a:pPr algn="ctr"/>
+            <a:r>
+              <a:rPr lang="en-GB" altLang="en-US"/>
+              <a:t>Title</a:t>
+            </a:r>
+            <a:endParaRPr lang="en-GB" altLang="en-US"/>
+          </a:p>
+        </p:txBody>
+      </p:sp>
     </p:spTree>
   </p:cSld>
   <p:clrMapOvr>

</xml_diff>